<commit_message>
Update office ergonomics training modules.
</commit_message>
<xml_diff>
--- a/docs/ppt/train_resumption_of_research.pptx
+++ b/docs/ppt/train_resumption_of_research.pptx
@@ -143,10 +143,7 @@
 <file path=ppt/revisionInfo.xml><?xml version="1.0" encoding="utf-8"?>
 <p1510:revInfo xmlns:a="http://schemas.openxmlformats.org/drawingml/2006/main" xmlns:r="http://schemas.openxmlformats.org/officeDocument/2006/relationships" xmlns:p1510="http://schemas.microsoft.com/office/powerpoint/2015/10/main">
   <p1510:revLst>
-    <p1510:client id="{5C322B0A-BA01-5A9A-7C51-E5185417B911}" v="3" dt="2020-05-27T15:25:27.940"/>
-    <p1510:client id="{6DB7C4E6-0224-4AA2-AC37-44B200CFE09B}" v="1" dt="2020-05-27T17:20:05.870"/>
-    <p1510:client id="{8A66436A-A808-4B92-A3C9-838113DABADF}" v="730" dt="2020-05-27T16:01:24.744"/>
-    <p1510:client id="{FBF8B34A-4D38-DD24-71B4-833EA18562B3}" v="3" dt="2020-05-27T14:57:05.037"/>
+    <p1510:client id="{8A66436A-A808-4B92-A3C9-838113DABADF}" v="735" dt="2020-06-10T13:54:47.720"/>
   </p1510:revLst>
 </p1510:revInfo>
 </file>
@@ -154,36 +151,27 @@
 <file path=ppt/changesInfos/changesInfo1.xml><?xml version="1.0" encoding="utf-8"?>
 <pc:chgInfo xmlns:a="http://schemas.openxmlformats.org/drawingml/2006/main" xmlns:r="http://schemas.openxmlformats.org/officeDocument/2006/relationships" xmlns:ac="http://schemas.microsoft.com/office/drawing/2013/main/command" xmlns:pc="http://schemas.microsoft.com/office/powerpoint/2013/main/command">
   <pc:docChgLst>
-    <pc:chgData name="Nelson, Brandy J." userId="8349798c-70a4-40cb-8160-2f22afab5a6d" providerId="ADAL" clId="{6DB7C4E6-0224-4AA2-AC37-44B200CFE09B}"/>
-    <pc:docChg chg="custSel modSld">
-      <pc:chgData name="Nelson, Brandy J." userId="8349798c-70a4-40cb-8160-2f22afab5a6d" providerId="ADAL" clId="{6DB7C4E6-0224-4AA2-AC37-44B200CFE09B}" dt="2020-05-27T17:20:24.139" v="4" actId="6549"/>
+    <pc:chgData name="Nelson, Brandy J." userId="8349798c-70a4-40cb-8160-2f22afab5a6d" providerId="ADAL" clId="{8A66436A-A808-4B92-A3C9-838113DABADF}"/>
+    <pc:docChg chg="undo custSel addSld delSld modSld sldOrd">
+      <pc:chgData name="Nelson, Brandy J." userId="8349798c-70a4-40cb-8160-2f22afab5a6d" providerId="ADAL" clId="{8A66436A-A808-4B92-A3C9-838113DABADF}" dt="2020-06-10T13:55:17.164" v="1054" actId="6549"/>
       <pc:docMkLst>
         <pc:docMk/>
       </pc:docMkLst>
       <pc:sldChg chg="modSp mod">
-        <pc:chgData name="Nelson, Brandy J." userId="8349798c-70a4-40cb-8160-2f22afab5a6d" providerId="ADAL" clId="{6DB7C4E6-0224-4AA2-AC37-44B200CFE09B}" dt="2020-05-27T17:20:24.139" v="4" actId="6549"/>
+        <pc:chgData name="Nelson, Brandy J." userId="8349798c-70a4-40cb-8160-2f22afab5a6d" providerId="ADAL" clId="{8A66436A-A808-4B92-A3C9-838113DABADF}" dt="2020-06-10T13:54:21.668" v="1045" actId="20577"/>
         <pc:sldMkLst>
           <pc:docMk/>
-          <pc:sldMk cId="2270263216" sldId="285"/>
+          <pc:sldMk cId="3133264755" sldId="260"/>
         </pc:sldMkLst>
-        <pc:spChg chg="mod">
-          <ac:chgData name="Nelson, Brandy J." userId="8349798c-70a4-40cb-8160-2f22afab5a6d" providerId="ADAL" clId="{6DB7C4E6-0224-4AA2-AC37-44B200CFE09B}" dt="2020-05-27T17:20:24.139" v="4" actId="6549"/>
-          <ac:spMkLst>
+        <pc:graphicFrameChg chg="mod modGraphic">
+          <ac:chgData name="Nelson, Brandy J." userId="8349798c-70a4-40cb-8160-2f22afab5a6d" providerId="ADAL" clId="{8A66436A-A808-4B92-A3C9-838113DABADF}" dt="2020-06-10T13:54:21.668" v="1045" actId="20577"/>
+          <ac:graphicFrameMkLst>
             <pc:docMk/>
-            <pc:sldMk cId="2270263216" sldId="285"/>
-            <ac:spMk id="3" creationId="{49CC0DA8-63F3-43BC-9E77-8F7F65BECD26}"/>
-          </ac:spMkLst>
-        </pc:spChg>
+            <pc:sldMk cId="3133264755" sldId="260"/>
+            <ac:graphicFrameMk id="4" creationId="{9AFB0C64-4287-4266-8FEE-883935F5069E}"/>
+          </ac:graphicFrameMkLst>
+        </pc:graphicFrameChg>
       </pc:sldChg>
-    </pc:docChg>
-  </pc:docChgLst>
-  <pc:docChgLst>
-    <pc:chgData name="Nelson, Brandy J." userId="8349798c-70a4-40cb-8160-2f22afab5a6d" providerId="ADAL" clId="{8A66436A-A808-4B92-A3C9-838113DABADF}"/>
-    <pc:docChg chg="undo custSel addSld delSld modSld sldOrd">
-      <pc:chgData name="Nelson, Brandy J." userId="8349798c-70a4-40cb-8160-2f22afab5a6d" providerId="ADAL" clId="{8A66436A-A808-4B92-A3C9-838113DABADF}" dt="2020-05-27T16:01:24.744" v="1032" actId="1037"/>
-      <pc:docMkLst>
-        <pc:docMk/>
-      </pc:docMkLst>
       <pc:sldChg chg="del">
         <pc:chgData name="Nelson, Brandy J." userId="8349798c-70a4-40cb-8160-2f22afab5a6d" providerId="ADAL" clId="{8A66436A-A808-4B92-A3C9-838113DABADF}" dt="2020-05-27T13:21:55.636" v="82" actId="47"/>
         <pc:sldMkLst>
@@ -321,7 +309,7 @@
         </pc:spChg>
       </pc:sldChg>
       <pc:sldChg chg="modSp mod">
-        <pc:chgData name="Nelson, Brandy J." userId="8349798c-70a4-40cb-8160-2f22afab5a6d" providerId="ADAL" clId="{8A66436A-A808-4B92-A3C9-838113DABADF}" dt="2020-05-27T13:26:46.903" v="217" actId="15"/>
+        <pc:chgData name="Nelson, Brandy J." userId="8349798c-70a4-40cb-8160-2f22afab5a6d" providerId="ADAL" clId="{8A66436A-A808-4B92-A3C9-838113DABADF}" dt="2020-06-10T13:55:17.164" v="1054" actId="6549"/>
         <pc:sldMkLst>
           <pc:docMk/>
           <pc:sldMk cId="976940578" sldId="275"/>
@@ -335,7 +323,7 @@
           </ac:spMkLst>
         </pc:spChg>
         <pc:spChg chg="mod">
-          <ac:chgData name="Nelson, Brandy J." userId="8349798c-70a4-40cb-8160-2f22afab5a6d" providerId="ADAL" clId="{8A66436A-A808-4B92-A3C9-838113DABADF}" dt="2020-05-27T13:26:46.903" v="217" actId="15"/>
+          <ac:chgData name="Nelson, Brandy J." userId="8349798c-70a4-40cb-8160-2f22afab5a6d" providerId="ADAL" clId="{8A66436A-A808-4B92-A3C9-838113DABADF}" dt="2020-06-10T13:55:17.164" v="1054" actId="6549"/>
           <ac:spMkLst>
             <pc:docMk/>
             <pc:sldMk cId="976940578" sldId="275"/>
@@ -412,8 +400,38 @@
           </ac:spMkLst>
         </pc:spChg>
       </pc:sldChg>
+      <pc:sldChg chg="modSp mod">
+        <pc:chgData name="Nelson, Brandy J." userId="8349798c-70a4-40cb-8160-2f22afab5a6d" providerId="ADAL" clId="{8A66436A-A808-4B92-A3C9-838113DABADF}" dt="2020-06-10T13:53:01.766" v="1033" actId="6549"/>
+        <pc:sldMkLst>
+          <pc:docMk/>
+          <pc:sldMk cId="2116998852" sldId="280"/>
+        </pc:sldMkLst>
+        <pc:spChg chg="mod">
+          <ac:chgData name="Nelson, Brandy J." userId="8349798c-70a4-40cb-8160-2f22afab5a6d" providerId="ADAL" clId="{8A66436A-A808-4B92-A3C9-838113DABADF}" dt="2020-06-10T13:53:01.766" v="1033" actId="6549"/>
+          <ac:spMkLst>
+            <pc:docMk/>
+            <pc:sldMk cId="2116998852" sldId="280"/>
+            <ac:spMk id="3" creationId="{CF0609FF-BA3A-4729-A0D9-5EF9BAF2D44E}"/>
+          </ac:spMkLst>
+        </pc:spChg>
+      </pc:sldChg>
+      <pc:sldChg chg="modSp mod">
+        <pc:chgData name="Nelson, Brandy J." userId="8349798c-70a4-40cb-8160-2f22afab5a6d" providerId="ADAL" clId="{8A66436A-A808-4B92-A3C9-838113DABADF}" dt="2020-06-10T13:54:37.506" v="1047" actId="6549"/>
+        <pc:sldMkLst>
+          <pc:docMk/>
+          <pc:sldMk cId="4231880016" sldId="282"/>
+        </pc:sldMkLst>
+        <pc:graphicFrameChg chg="modGraphic">
+          <ac:chgData name="Nelson, Brandy J." userId="8349798c-70a4-40cb-8160-2f22afab5a6d" providerId="ADAL" clId="{8A66436A-A808-4B92-A3C9-838113DABADF}" dt="2020-06-10T13:54:37.506" v="1047" actId="6549"/>
+          <ac:graphicFrameMkLst>
+            <pc:docMk/>
+            <pc:sldMk cId="4231880016" sldId="282"/>
+            <ac:graphicFrameMk id="4" creationId="{9AFB0C64-4287-4266-8FEE-883935F5069E}"/>
+          </ac:graphicFrameMkLst>
+        </pc:graphicFrameChg>
+      </pc:sldChg>
       <pc:sldChg chg="modSp add mod">
-        <pc:chgData name="Nelson, Brandy J." userId="8349798c-70a4-40cb-8160-2f22afab5a6d" providerId="ADAL" clId="{8A66436A-A808-4B92-A3C9-838113DABADF}" dt="2020-05-27T13:25:27.908" v="197"/>
+        <pc:chgData name="Nelson, Brandy J." userId="8349798c-70a4-40cb-8160-2f22afab5a6d" providerId="ADAL" clId="{8A66436A-A808-4B92-A3C9-838113DABADF}" dt="2020-06-10T13:55:01.634" v="1052" actId="13926"/>
         <pc:sldMkLst>
           <pc:docMk/>
           <pc:sldMk cId="2270263216" sldId="285"/>
@@ -427,7 +445,7 @@
           </ac:spMkLst>
         </pc:spChg>
         <pc:spChg chg="mod">
-          <ac:chgData name="Nelson, Brandy J." userId="8349798c-70a4-40cb-8160-2f22afab5a6d" providerId="ADAL" clId="{8A66436A-A808-4B92-A3C9-838113DABADF}" dt="2020-05-27T13:25:27.908" v="197"/>
+          <ac:chgData name="Nelson, Brandy J." userId="8349798c-70a4-40cb-8160-2f22afab5a6d" providerId="ADAL" clId="{8A66436A-A808-4B92-A3C9-838113DABADF}" dt="2020-06-10T13:55:01.634" v="1052" actId="13926"/>
           <ac:spMkLst>
             <pc:docMk/>
             <pc:sldMk cId="2270263216" sldId="285"/>
@@ -926,7 +944,7 @@
           <a:p>
             <a:fld id="{7FE95C8A-9543-4C1D-B17C-F81DDBD1E417}" type="datetimeFigureOut">
               <a:rPr lang="en-US" smtClean="0"/>
-              <a:t>5/27/2020</a:t>
+              <a:t>6/10/2020</a:t>
             </a:fld>
             <a:endParaRPr lang="en-US"/>
           </a:p>
@@ -1124,7 +1142,7 @@
           <a:p>
             <a:fld id="{7FE95C8A-9543-4C1D-B17C-F81DDBD1E417}" type="datetimeFigureOut">
               <a:rPr lang="en-US" smtClean="0"/>
-              <a:t>5/27/2020</a:t>
+              <a:t>6/10/2020</a:t>
             </a:fld>
             <a:endParaRPr lang="en-US"/>
           </a:p>
@@ -1332,7 +1350,7 @@
           <a:p>
             <a:fld id="{7FE95C8A-9543-4C1D-B17C-F81DDBD1E417}" type="datetimeFigureOut">
               <a:rPr lang="en-US" smtClean="0"/>
-              <a:t>5/27/2020</a:t>
+              <a:t>6/10/2020</a:t>
             </a:fld>
             <a:endParaRPr lang="en-US"/>
           </a:p>
@@ -1530,7 +1548,7 @@
           <a:p>
             <a:fld id="{7FE95C8A-9543-4C1D-B17C-F81DDBD1E417}" type="datetimeFigureOut">
               <a:rPr lang="en-US" smtClean="0"/>
-              <a:t>5/27/2020</a:t>
+              <a:t>6/10/2020</a:t>
             </a:fld>
             <a:endParaRPr lang="en-US"/>
           </a:p>
@@ -1805,7 +1823,7 @@
           <a:p>
             <a:fld id="{7FE95C8A-9543-4C1D-B17C-F81DDBD1E417}" type="datetimeFigureOut">
               <a:rPr lang="en-US" smtClean="0"/>
-              <a:t>5/27/2020</a:t>
+              <a:t>6/10/2020</a:t>
             </a:fld>
             <a:endParaRPr lang="en-US"/>
           </a:p>
@@ -2070,7 +2088,7 @@
           <a:p>
             <a:fld id="{7FE95C8A-9543-4C1D-B17C-F81DDBD1E417}" type="datetimeFigureOut">
               <a:rPr lang="en-US" smtClean="0"/>
-              <a:t>5/27/2020</a:t>
+              <a:t>6/10/2020</a:t>
             </a:fld>
             <a:endParaRPr lang="en-US"/>
           </a:p>
@@ -2482,7 +2500,7 @@
           <a:p>
             <a:fld id="{7FE95C8A-9543-4C1D-B17C-F81DDBD1E417}" type="datetimeFigureOut">
               <a:rPr lang="en-US" smtClean="0"/>
-              <a:t>5/27/2020</a:t>
+              <a:t>6/10/2020</a:t>
             </a:fld>
             <a:endParaRPr lang="en-US"/>
           </a:p>
@@ -2623,7 +2641,7 @@
           <a:p>
             <a:fld id="{7FE95C8A-9543-4C1D-B17C-F81DDBD1E417}" type="datetimeFigureOut">
               <a:rPr lang="en-US" smtClean="0"/>
-              <a:t>5/27/2020</a:t>
+              <a:t>6/10/2020</a:t>
             </a:fld>
             <a:endParaRPr lang="en-US"/>
           </a:p>
@@ -2736,7 +2754,7 @@
           <a:p>
             <a:fld id="{7FE95C8A-9543-4C1D-B17C-F81DDBD1E417}" type="datetimeFigureOut">
               <a:rPr lang="en-US" smtClean="0"/>
-              <a:t>5/27/2020</a:t>
+              <a:t>6/10/2020</a:t>
             </a:fld>
             <a:endParaRPr lang="en-US"/>
           </a:p>
@@ -3047,7 +3065,7 @@
           <a:p>
             <a:fld id="{7FE95C8A-9543-4C1D-B17C-F81DDBD1E417}" type="datetimeFigureOut">
               <a:rPr lang="en-US" smtClean="0"/>
-              <a:t>5/27/2020</a:t>
+              <a:t>6/10/2020</a:t>
             </a:fld>
             <a:endParaRPr lang="en-US"/>
           </a:p>
@@ -3335,7 +3353,7 @@
           <a:p>
             <a:fld id="{7FE95C8A-9543-4C1D-B17C-F81DDBD1E417}" type="datetimeFigureOut">
               <a:rPr lang="en-US" smtClean="0"/>
-              <a:t>5/27/2020</a:t>
+              <a:t>6/10/2020</a:t>
             </a:fld>
             <a:endParaRPr lang="en-US"/>
           </a:p>
@@ -3576,7 +3594,7 @@
           <a:p>
             <a:fld id="{7FE95C8A-9543-4C1D-B17C-F81DDBD1E417}" type="datetimeFigureOut">
               <a:rPr lang="en-US" smtClean="0"/>
-              <a:t>5/27/2020</a:t>
+              <a:t>6/10/2020</a:t>
             </a:fld>
             <a:endParaRPr lang="en-US"/>
           </a:p>
@@ -4595,7 +4613,7 @@
           <a:lstStyle/>
           <a:p>
             <a:r>
-              <a:rPr lang="en-US" sz="3600"/>
+              <a:rPr lang="en-US" sz="3600" dirty="0"/>
               <a:t>Maximizing Spatial Distancing in Research Workspaces:</a:t>
             </a:r>
           </a:p>
@@ -4631,7 +4649,7 @@
               <a:buNone/>
             </a:pPr>
             <a:r>
-              <a:rPr lang="en-US"/>
+              <a:rPr lang="en-US" dirty="0"/>
               <a:t>BBSRB as an example open lab environment.</a:t>
             </a:r>
           </a:p>
@@ -4818,7 +4836,7 @@
           <a:lstStyle/>
           <a:p>
             <a:r>
-              <a:rPr lang="en-US" sz="1400"/>
+              <a:rPr lang="en-US" sz="1400" dirty="0"/>
               <a:t>Special purpose rooms may only be able to accommodate one person and should be managed by scheduling.</a:t>
             </a:r>
           </a:p>
@@ -4994,7 +5012,7 @@
           <a:lstStyle/>
           <a:p>
             <a:r>
-              <a:rPr lang="en-US" sz="1400"/>
+              <a:rPr lang="en-US" sz="1400" dirty="0"/>
               <a:t>Maintain space with staggered stations.</a:t>
             </a:r>
           </a:p>
@@ -5143,7 +5161,7 @@
           <a:lstStyle/>
           <a:p>
             <a:r>
-              <a:rPr lang="en-US" sz="1400"/>
+              <a:rPr lang="en-US" sz="1400" dirty="0"/>
               <a:t>Do not work directly across from another person.</a:t>
             </a:r>
           </a:p>
@@ -5268,7 +5286,7 @@
           <a:lstStyle/>
           <a:p>
             <a:r>
-              <a:rPr lang="en-US" sz="1400"/>
+              <a:rPr lang="en-US" sz="1400" dirty="0"/>
               <a:t>Floor markings at 6ft distances are helpful.</a:t>
             </a:r>
           </a:p>
@@ -6533,7 +6551,7 @@
         <p:spPr/>
         <p:txBody>
           <a:bodyPr>
-            <a:normAutofit fontScale="92500" lnSpcReduction="10000"/>
+            <a:normAutofit lnSpcReduction="10000"/>
           </a:bodyPr>
           <a:lstStyle/>
           <a:p>
@@ -6545,21 +6563,11 @@
               <a:rPr lang="en-US" dirty="0">
                 <a:hlinkClick r:id="rId2"/>
               </a:rPr>
-              <a:t>https://uky.az1.qualtrics.com/jfe/form/SV</a:t>
-            </a:r>
-            <a:r>
-              <a:rPr lang="en-US">
-                <a:hlinkClick r:id="rId2"/>
-              </a:rPr>
-              <a:t>_4OPSe7nwFHyv1R3</a:t>
-            </a:r>
-            <a:r>
-              <a:rPr lang="en-US"/>
-              <a:t>) </a:t>
+              <a:t>https://www.research.uky.edu/resources/covid-19-guidance-researchers</a:t>
             </a:r>
             <a:r>
               <a:rPr lang="en-US" dirty="0"/>
-              <a:t>for resumption of research.  </a:t>
+              <a:t>) for resumption of research.  </a:t>
             </a:r>
           </a:p>
           <a:p>
@@ -6897,18 +6905,18 @@
           <a:p>
             <a:pPr lvl="0"/>
             <a:r>
-              <a:rPr lang="en-US" b="1"/>
+              <a:rPr lang="en-US" b="1" dirty="0"/>
               <a:t>Changes in operating mode</a:t>
             </a:r>
             <a:r>
-              <a:rPr lang="en-US"/>
-              <a:t>:  Plans will include calendars and/or shift work to maintain social distancing, responsibilities and process for cleaning and disinfecting specific pieces of equipment used by many research personnel both before and after use (add link to website), size and mode of research or research-related meetings, assigning specific responsibilities to personnel to avoid duplication and need for several people to be in limited space areas (e.g., DLAR rooms, cell culture hoods, etc.). </a:t>
+              <a:rPr lang="en-US" dirty="0"/>
+              <a:t>:  Plans will include calendars and/or shift work to maintain social distancing, responsibilities and process for cleaning and disinfecting specific pieces of equipment used by many research personnel both before and after use, size and mode of research or research-related meetings, assigning specific responsibilities to personnel to avoid duplication and need for several people to be in limited space areas (e.g., DLAR rooms, cell culture hoods, etc.). </a:t>
             </a:r>
           </a:p>
           <a:p>
             <a:pPr lvl="1"/>
             <a:r>
-              <a:rPr lang="en-US"/>
+              <a:rPr lang="en-US" dirty="0"/>
               <a:t>When moving from one phase to the next, you must adhere to social distancing, using shift work or scheduling to accommodate more research activity by investigators within your workspace who were not prioritized in earlier phases.</a:t>
             </a:r>
           </a:p>
@@ -7349,16 +7357,16 @@
           <a:lstStyle/>
           <a:p>
             <a:r>
-              <a:rPr lang="en-US"/>
+              <a:rPr lang="en-US" dirty="0"/>
               <a:t>It is the responsibility of all personnel engaged in research to adhere to the general underlying principles within this document and the approved PI individual plan for resumption of their research.</a:t>
             </a:r>
           </a:p>
           <a:p>
             <a:r>
-              <a:rPr lang="en-US"/>
+              <a:rPr lang="en-US" dirty="0"/>
               <a:t>Unannounced visits or checks on activity will be performed by appropriate Chairs and/or ADR, in conjunction with personnel from Environmental Health and Safety, to assure adherence to approved plans. </a:t>
             </a:r>
-            <a:endParaRPr lang="en-US">
+            <a:endParaRPr lang="en-US" dirty="0">
               <a:solidFill>
                 <a:srgbClr val="FF0000"/>
               </a:solidFill>
@@ -7701,43 +7709,43 @@
               <a:buNone/>
             </a:pPr>
             <a:r>
-              <a:rPr lang="en-US"/>
+              <a:rPr lang="en-US" dirty="0"/>
               <a:t>Phases of resumed research activity are defined in terms of percent activity and are as follows:  </a:t>
             </a:r>
           </a:p>
           <a:p>
             <a:pPr lvl="0"/>
             <a:r>
-              <a:rPr lang="en-US"/>
+              <a:rPr lang="en-US" dirty="0"/>
               <a:t>Phase 1 represents access restricted to only the maintenance of </a:t>
             </a:r>
             <a:r>
-              <a:rPr lang="en-US" b="1"/>
+              <a:rPr lang="en-US" b="1" dirty="0"/>
               <a:t>essential and critical </a:t>
             </a:r>
             <a:r>
-              <a:rPr lang="en-US"/>
-              <a:t>research capability (15-20% of normal access; add link). Social distancing guidelines, defined above, take priority over percent workspace occupation during this and subsequent phases.  We have been in phase 1 since March 20.</a:t>
+              <a:rPr lang="en-US" dirty="0"/>
+              <a:t>research capability (15-20% of normal access). Social distancing guidelines, defined above, take priority over percent workspace occupation during this and subsequent phases.  We have been in phase 1 since March 20.</a:t>
             </a:r>
           </a:p>
           <a:p>
             <a:pPr lvl="0"/>
             <a:r>
-              <a:rPr lang="en-US"/>
+              <a:rPr lang="en-US" dirty="0"/>
               <a:t>Phase 2 represents 20-50% of prior research activity, with new safety measures in place. </a:t>
             </a:r>
           </a:p>
           <a:p>
             <a:pPr lvl="0"/>
             <a:r>
-              <a:rPr lang="en-US"/>
+              <a:rPr lang="en-US" dirty="0"/>
               <a:t>Phase 3 represents 50-70% of prior research activity.  </a:t>
             </a:r>
           </a:p>
           <a:p>
             <a:pPr lvl="0"/>
             <a:r>
-              <a:rPr lang="en-US"/>
+              <a:rPr lang="en-US" dirty="0"/>
               <a:t>Phase 4 represents a return to research activities (at 70-100% of prior activity).  </a:t>
             </a:r>
           </a:p>
@@ -7817,14 +7825,14 @@
             <p:ph idx="1"/>
             <p:extLst>
               <p:ext uri="{D42A27DB-BD31-4B8C-83A1-F6EECF244321}">
-                <p14:modId xmlns:p14="http://schemas.microsoft.com/office/powerpoint/2010/main" val="3321255000"/>
+                <p14:modId xmlns:p14="http://schemas.microsoft.com/office/powerpoint/2010/main" val="3128233786"/>
               </p:ext>
             </p:extLst>
           </p:nvPr>
         </p:nvGraphicFramePr>
         <p:xfrm>
           <a:off x="838200" y="1825625"/>
-          <a:ext cx="10515600" cy="4197488"/>
+          <a:ext cx="10515600" cy="4261479"/>
         </p:xfrm>
         <a:graphic>
           <a:graphicData uri="http://schemas.openxmlformats.org/drawingml/2006/table">
@@ -7877,7 +7885,7 @@
                         </a:spcAft>
                       </a:pPr>
                       <a:r>
-                        <a:rPr lang="en-US" sz="1200" b="1">
+                        <a:rPr lang="en-US" sz="1200" b="1" dirty="0">
                           <a:effectLst/>
                           <a:latin typeface="+mn-lt"/>
                           <a:ea typeface="Calibri" panose="020F0502020204030204" pitchFamily="34" charset="0"/>
@@ -7885,7 +7893,7 @@
                         </a:rPr>
                         <a:t>EXTERNAL CONDITIONS</a:t>
                       </a:r>
-                      <a:endParaRPr lang="en-US" sz="1200">
+                      <a:endParaRPr lang="en-US" sz="1200" dirty="0">
                         <a:effectLst/>
                         <a:latin typeface="+mn-lt"/>
                         <a:ea typeface="Calibri" panose="020F0502020204030204" pitchFamily="34" charset="0"/>
@@ -8192,7 +8200,7 @@
                         <a:buFont typeface="Symbol" panose="05050102010706020507" pitchFamily="18" charset="2"/>
                         <a:buChar char=""/>
                       </a:pPr>
-                      <a:endParaRPr lang="en-US" sz="1400">
+                      <a:endParaRPr lang="en-US" sz="1400" dirty="0">
                         <a:effectLst/>
                         <a:latin typeface="+mn-lt"/>
                         <a:ea typeface="Calibri" panose="020F0502020204030204" pitchFamily="34" charset="0"/>
@@ -8214,13 +8222,32 @@
                         <a:buChar char=""/>
                       </a:pPr>
                       <a:r>
-                        <a:rPr lang="en-US" sz="1400">
+                        <a:rPr lang="en-US" sz="1400" dirty="0">
                           <a:effectLst/>
                           <a:latin typeface="+mn-lt"/>
                           <a:ea typeface="Calibri" panose="020F0502020204030204" pitchFamily="34" charset="0"/>
                           <a:cs typeface="Times New Roman" panose="02020603050405020304" pitchFamily="18" charset="0"/>
                         </a:rPr>
-                        <a:t>Only essential research activities allowed on campus (for definition of essential research see link).</a:t>
+                        <a:t>Only essential research activities allowed on campus (for definition of essential research see </a:t>
+                      </a:r>
+                      <a:r>
+                        <a:rPr lang="en-US" sz="1400" dirty="0">
+                          <a:effectLst/>
+                          <a:latin typeface="+mn-lt"/>
+                          <a:ea typeface="Calibri" panose="020F0502020204030204" pitchFamily="34" charset="0"/>
+                          <a:cs typeface="Times New Roman" panose="02020603050405020304" pitchFamily="18" charset="0"/>
+                          <a:hlinkClick r:id="rId2"/>
+                        </a:rPr>
+                        <a:t>https://www.research.uky.edu/resources/covid-19-guidance-researchers</a:t>
+                      </a:r>
+                      <a:r>
+                        <a:rPr lang="en-US" sz="1400" dirty="0">
+                          <a:effectLst/>
+                          <a:latin typeface="+mn-lt"/>
+                          <a:ea typeface="Calibri" panose="020F0502020204030204" pitchFamily="34" charset="0"/>
+                          <a:cs typeface="Times New Roman" panose="02020603050405020304" pitchFamily="18" charset="0"/>
+                        </a:rPr>
+                        <a:t>). </a:t>
                       </a:r>
                     </a:p>
                     <a:p>
@@ -8238,7 +8265,7 @@
                         <a:buChar char=""/>
                       </a:pPr>
                       <a:r>
-                        <a:rPr lang="en-US" sz="1400">
+                        <a:rPr lang="en-US" sz="1400" dirty="0">
                           <a:effectLst/>
                           <a:latin typeface="+mn-lt"/>
                           <a:ea typeface="Calibri" panose="020F0502020204030204" pitchFamily="34" charset="0"/>
@@ -8262,7 +8289,7 @@
                         <a:buChar char=""/>
                       </a:pPr>
                       <a:r>
-                        <a:rPr lang="en-US" sz="1400">
+                        <a:rPr lang="en-US" sz="1400" dirty="0">
                           <a:effectLst/>
                           <a:latin typeface="+mn-lt"/>
                           <a:ea typeface="Calibri" panose="020F0502020204030204" pitchFamily="34" charset="0"/>
@@ -8286,13 +8313,32 @@
                         <a:buChar char=""/>
                       </a:pPr>
                       <a:r>
-                        <a:rPr lang="en-US" sz="1400">
+                        <a:rPr lang="en-US" sz="1400" dirty="0">
                           <a:effectLst/>
                           <a:latin typeface="+mn-lt"/>
                           <a:ea typeface="Calibri" panose="020F0502020204030204" pitchFamily="34" charset="0"/>
                           <a:cs typeface="Times New Roman" panose="02020603050405020304" pitchFamily="18" charset="0"/>
                         </a:rPr>
-                        <a:t>Waivers required to perform either COVID-19 research or for essential on campus activities (link).</a:t>
+                        <a:t>Waivers required to perform either COVID-19 research or for essential on campus activities (</a:t>
+                      </a:r>
+                      <a:r>
+                        <a:rPr lang="en-US" sz="1400" dirty="0">
+                          <a:effectLst/>
+                          <a:latin typeface="+mn-lt"/>
+                          <a:ea typeface="Calibri" panose="020F0502020204030204" pitchFamily="34" charset="0"/>
+                          <a:cs typeface="Times New Roman" panose="02020603050405020304" pitchFamily="18" charset="0"/>
+                          <a:hlinkClick r:id="rId2"/>
+                        </a:rPr>
+                        <a:t>https://www.research.uky.edu/resources/covid-19-guidance-researchers</a:t>
+                      </a:r>
+                      <a:r>
+                        <a:rPr lang="en-US" sz="1400" dirty="0">
+                          <a:effectLst/>
+                          <a:latin typeface="+mn-lt"/>
+                          <a:ea typeface="Calibri" panose="020F0502020204030204" pitchFamily="34" charset="0"/>
+                          <a:cs typeface="Times New Roman" panose="02020603050405020304" pitchFamily="18" charset="0"/>
+                        </a:rPr>
+                        <a:t>). </a:t>
                       </a:r>
                     </a:p>
                   </a:txBody>
@@ -8311,7 +8357,7 @@
                           <a:spcPts val="0"/>
                         </a:spcAft>
                       </a:pPr>
-                      <a:endParaRPr lang="en-US" sz="1400">
+                      <a:endParaRPr lang="en-US" sz="1400" dirty="0">
                         <a:effectLst/>
                         <a:latin typeface="+mn-lt"/>
                         <a:ea typeface="Calibri" panose="020F0502020204030204" pitchFamily="34" charset="0"/>
@@ -8328,7 +8374,7 @@
                         </a:spcAft>
                       </a:pPr>
                       <a:r>
-                        <a:rPr lang="en-US" sz="1400">
+                        <a:rPr lang="en-US" sz="1400" dirty="0">
                           <a:effectLst/>
                           <a:latin typeface="+mn-lt"/>
                           <a:ea typeface="Calibri" panose="020F0502020204030204" pitchFamily="34" charset="0"/>
@@ -9055,7 +9101,7 @@
             <p:ph idx="1"/>
             <p:extLst>
               <p:ext uri="{D42A27DB-BD31-4B8C-83A1-F6EECF244321}">
-                <p14:modId xmlns:p14="http://schemas.microsoft.com/office/powerpoint/2010/main" val="944871721"/>
+                <p14:modId xmlns:p14="http://schemas.microsoft.com/office/powerpoint/2010/main" val="204395490"/>
               </p:ext>
             </p:extLst>
           </p:nvPr>
@@ -9115,7 +9161,7 @@
                         </a:spcAft>
                       </a:pPr>
                       <a:r>
-                        <a:rPr lang="en-US" sz="1200" b="1">
+                        <a:rPr lang="en-US" sz="1200" b="1" dirty="0">
                           <a:effectLst/>
                           <a:latin typeface="+mn-lt"/>
                           <a:ea typeface="Calibri" panose="020F0502020204030204" pitchFamily="34" charset="0"/>
@@ -9123,7 +9169,7 @@
                         </a:rPr>
                         <a:t>EXTERNAL CONDITIONS</a:t>
                       </a:r>
-                      <a:endParaRPr lang="en-US" sz="1200">
+                      <a:endParaRPr lang="en-US" sz="1200" dirty="0">
                         <a:effectLst/>
                         <a:latin typeface="+mn-lt"/>
                         <a:ea typeface="Calibri" panose="020F0502020204030204" pitchFamily="34" charset="0"/>
@@ -9406,7 +9452,7 @@
                         <a:buFont typeface="Symbol" panose="05050102010706020507" pitchFamily="18" charset="2"/>
                         <a:buChar char=""/>
                       </a:pPr>
-                      <a:endParaRPr lang="en-US" sz="1400">
+                      <a:endParaRPr lang="en-US" sz="1400" dirty="0">
                         <a:effectLst/>
                         <a:latin typeface="+mn-lt"/>
                         <a:ea typeface="Calibri" panose="020F0502020204030204" pitchFamily="34" charset="0"/>
@@ -9428,13 +9474,13 @@
                         <a:buChar char=""/>
                       </a:pPr>
                       <a:r>
-                        <a:rPr lang="en-US" sz="1400">
+                        <a:rPr lang="en-US" sz="1400" dirty="0">
                           <a:effectLst/>
                           <a:latin typeface="+mn-lt"/>
                           <a:ea typeface="Calibri" panose="020F0502020204030204" pitchFamily="34" charset="0"/>
                           <a:cs typeface="Times New Roman" panose="02020603050405020304" pitchFamily="18" charset="0"/>
                         </a:rPr>
-                        <a:t>Consistent with Office of Research Integrity (ORI) guidelines, currently paused observational, clinical, behavioral, population and interventional research ramps up under controlled conditions (e.g., face-to-face interactions in controlled facilities (add link).</a:t>
+                        <a:t>Consistent with Office of Research Integrity (ORI) guidelines, currently paused observational, clinical, behavioral, population and interventional research ramps up under controlled conditions (e.g., face-to-face interactions in controlled facilities.</a:t>
                       </a:r>
                     </a:p>
                     <a:p>
@@ -9452,7 +9498,7 @@
                         <a:buChar char=""/>
                       </a:pPr>
                       <a:r>
-                        <a:rPr lang="en-US" sz="1400">
+                        <a:rPr lang="en-US" sz="1400" dirty="0">
                           <a:effectLst/>
                           <a:latin typeface="+mn-lt"/>
                           <a:ea typeface="Calibri" panose="020F0502020204030204" pitchFamily="34" charset="0"/>
@@ -9476,7 +9522,7 @@
                         <a:buChar char=""/>
                       </a:pPr>
                       <a:r>
-                        <a:rPr lang="en-US" sz="1400">
+                        <a:rPr lang="en-US" sz="1400" dirty="0">
                           <a:effectLst/>
                           <a:latin typeface="+mn-lt"/>
                           <a:ea typeface="Calibri" panose="020F0502020204030204" pitchFamily="34" charset="0"/>
@@ -9500,7 +9546,7 @@
                         <a:buChar char=""/>
                       </a:pPr>
                       <a:r>
-                        <a:rPr lang="en-US" sz="1400">
+                        <a:rPr lang="en-US" sz="1400" dirty="0">
                           <a:effectLst/>
                           <a:latin typeface="+mn-lt"/>
                           <a:ea typeface="Calibri" panose="020F0502020204030204" pitchFamily="34" charset="0"/>
@@ -9524,7 +9570,7 @@
                         <a:buChar char=""/>
                       </a:pPr>
                       <a:r>
-                        <a:rPr lang="en-US" sz="1400">
+                        <a:rPr lang="en-US" sz="1400" dirty="0">
                           <a:effectLst/>
                           <a:latin typeface="+mn-lt"/>
                           <a:ea typeface="Calibri" panose="020F0502020204030204" pitchFamily="34" charset="0"/>
@@ -9548,7 +9594,7 @@
                         <a:buChar char=""/>
                       </a:pPr>
                       <a:r>
-                        <a:rPr lang="en-US" sz="1400">
+                        <a:rPr lang="en-US" sz="1400" dirty="0">
                           <a:effectLst/>
                           <a:latin typeface="+mn-lt"/>
                           <a:ea typeface="Calibri" panose="020F0502020204030204" pitchFamily="34" charset="0"/>
@@ -10552,15 +10598,6 @@
 </file>
 
 <file path=customXml/item1.xml><?xml version="1.0" encoding="utf-8"?>
-<?mso-contentType ?>
-<FormTemplates xmlns="http://schemas.microsoft.com/sharepoint/v3/contenttype/forms">
-  <Display>DocumentLibraryForm</Display>
-  <Edit>DocumentLibraryForm</Edit>
-  <New>DocumentLibraryForm</New>
-</FormTemplates>
-</file>
-
-<file path=customXml/item2.xml><?xml version="1.0" encoding="utf-8"?>
 <ct:contentTypeSchema xmlns:ct="http://schemas.microsoft.com/office/2006/metadata/contentType" xmlns:ma="http://schemas.microsoft.com/office/2006/metadata/properties/metaAttributes" ct:_="" ma:_="" ma:contentTypeName="Document" ma:contentTypeID="0x010100D506F8CF302B3141A5655A55771727D9" ma:contentTypeVersion="13" ma:contentTypeDescription="Create a new document." ma:contentTypeScope="" ma:versionID="990d34a33416f902ac33ff7eaa1c0718">
   <xsd:schema xmlns:xsd="http://www.w3.org/2001/XMLSchema" xmlns:xs="http://www.w3.org/2001/XMLSchema" xmlns:p="http://schemas.microsoft.com/office/2006/metadata/properties" xmlns:ns3="7a9a87b1-0d1e-4ff9-8d2a-74c34f582f30" xmlns:ns4="eeed71f9-b1dd-4428-a5bd-20b51fb0466f" targetNamespace="http://schemas.microsoft.com/office/2006/metadata/properties" ma:root="true" ma:fieldsID="519cad78a3beb5c1cbcee914feb9d5d7" ns3:_="" ns4:_="">
     <xsd:import namespace="7a9a87b1-0d1e-4ff9-8d2a-74c34f582f30"/>
@@ -10783,6 +10820,15 @@
 </ct:contentTypeSchema>
 </file>
 
+<file path=customXml/item2.xml><?xml version="1.0" encoding="utf-8"?>
+<?mso-contentType ?>
+<FormTemplates xmlns="http://schemas.microsoft.com/sharepoint/v3/contenttype/forms">
+  <Display>DocumentLibraryForm</Display>
+  <Edit>DocumentLibraryForm</Edit>
+  <New>DocumentLibraryForm</New>
+</FormTemplates>
+</file>
+
 <file path=customXml/item3.xml><?xml version="1.0" encoding="utf-8"?>
 <p:properties xmlns:p="http://schemas.microsoft.com/office/2006/metadata/properties" xmlns:xsi="http://www.w3.org/2001/XMLSchema-instance" xmlns:pc="http://schemas.microsoft.com/office/infopath/2007/PartnerControls">
   <documentManagement/>
@@ -10790,14 +10836,6 @@
 </file>
 
 <file path=customXml/itemProps1.xml><?xml version="1.0" encoding="utf-8"?>
-<ds:datastoreItem xmlns:ds="http://schemas.openxmlformats.org/officeDocument/2006/customXml" ds:itemID="{1DB0770D-2520-4673-A753-4EEC0582A1BC}">
-  <ds:schemaRefs>
-    <ds:schemaRef ds:uri="http://schemas.microsoft.com/sharepoint/v3/contenttype/forms"/>
-  </ds:schemaRefs>
-</ds:datastoreItem>
-</file>
-
-<file path=customXml/itemProps2.xml><?xml version="1.0" encoding="utf-8"?>
 <ds:datastoreItem xmlns:ds="http://schemas.openxmlformats.org/officeDocument/2006/customXml" ds:itemID="{72292507-C00E-4222-B61D-55CDB69EBE56}">
   <ds:schemaRefs>
     <ds:schemaRef ds:uri="http://schemas.microsoft.com/office/2006/metadata/contentType"/>
@@ -10816,6 +10854,14 @@
 </ds:datastoreItem>
 </file>
 
+<file path=customXml/itemProps2.xml><?xml version="1.0" encoding="utf-8"?>
+<ds:datastoreItem xmlns:ds="http://schemas.openxmlformats.org/officeDocument/2006/customXml" ds:itemID="{1DB0770D-2520-4673-A753-4EEC0582A1BC}">
+  <ds:schemaRefs>
+    <ds:schemaRef ds:uri="http://schemas.microsoft.com/sharepoint/v3/contenttype/forms"/>
+  </ds:schemaRefs>
+</ds:datastoreItem>
+</file>
+
 <file path=customXml/itemProps3.xml><?xml version="1.0" encoding="utf-8"?>
 <ds:datastoreItem xmlns:ds="http://schemas.openxmlformats.org/officeDocument/2006/customXml" ds:itemID="{B0A353C8-FB26-4E6A-B7EA-E0B0F37009FB}">
   <ds:schemaRefs>

</xml_diff>